<commit_message>
Updated PPTX after content generation
</commit_message>
<xml_diff>
--- a/output/Artificial_Intelligence_in_Healthcare.pptx
+++ b/output/Artificial_Intelligence_in_Healthcare.pptx
@@ -3197,7 +3197,7 @@
               <a:defRPr sz="2000"/>
             </a:pPr>
             <a:r>
-              <a:t>AI is revolutionizing healthcare across various domains.</a:t>
+              <a:t>AI is transforming healthcare delivery and research.</a:t>
             </a:r>
           </a:p>
           <a:p>
@@ -3205,7 +3205,7 @@
               <a:defRPr sz="2000"/>
             </a:pPr>
             <a:r>
-              <a:t>AI improves diagnostics, treatment, and patient care.</a:t>
+              <a:t>AI applications range from diagnostics to drug discovery.</a:t>
             </a:r>
           </a:p>
           <a:p>
@@ -3213,7 +3213,7 @@
               <a:defRPr sz="2000"/>
             </a:pPr>
             <a:r>
-              <a:t>Ethical considerations are crucial in AI healthcare implementation.</a:t>
+              <a:t>Ethical considerations are paramount for responsible AI adoption.</a:t>
             </a:r>
           </a:p>
         </p:txBody>
@@ -3252,7 +3252,7 @@
           <a:lstStyle/>
           <a:p>
             <a:r>
-              <a:t>Introduction to AI in Healthcare</a:t>
+              <a:t>Introduction: AI Revolutionizing Healthcare</a:t>
             </a:r>
           </a:p>
         </p:txBody>
@@ -3277,7 +3277,7 @@
               <a:defRPr sz="1800"/>
             </a:pPr>
             <a:r>
-              <a:t>AI transforming diagnostics, drug discovery, patient care, and healthcare administration.</a:t>
+              <a:t>AI is rapidly changing the healthcare landscape, offering unprecedented opportunities to improve patient care, streamline processes, and accelerate research.</a:t>
             </a:r>
           </a:p>
           <a:p>
@@ -3285,7 +3285,31 @@
               <a:defRPr sz="1800"/>
             </a:pPr>
             <a:r>
-              <a:t>Examples include: Image recognition, natural language processing, and machine learning algorithms.</a:t>
+              <a:t>Enhanced Diagnostics</a:t>
+            </a:r>
+          </a:p>
+          <a:p>
+            <a:pPr>
+              <a:defRPr sz="1800"/>
+            </a:pPr>
+            <a:r>
+              <a:t>Personalized Treatment Plans</a:t>
+            </a:r>
+          </a:p>
+          <a:p>
+            <a:pPr>
+              <a:defRPr sz="1800"/>
+            </a:pPr>
+            <a:r>
+              <a:t>Drug Discovery Acceleration</a:t>
+            </a:r>
+          </a:p>
+          <a:p>
+            <a:pPr>
+              <a:defRPr sz="1800"/>
+            </a:pPr>
+            <a:r>
+              <a:t>Operational Efficiency</a:t>
             </a:r>
           </a:p>
         </p:txBody>
@@ -3313,7 +3337,7 @@
           <a:lstStyle/>
           <a:p>
             <a:r>
-              <a:t>💡 AI doctor analyzing patient scan</a:t>
+              <a:t>💡 AI brain scan visualization</a:t>
             </a:r>
           </a:p>
         </p:txBody>
@@ -3352,7 +3376,7 @@
           <a:lstStyle/>
           <a:p>
             <a:r>
-              <a:t>AI-Powered Diagnostics</a:t>
+              <a:t>AI in Diagnostics: Early and Accurate</a:t>
             </a:r>
           </a:p>
         </p:txBody>
@@ -3377,7 +3401,7 @@
               <a:defRPr sz="1800"/>
             </a:pPr>
             <a:r>
-              <a:t>Improved accuracy and speed in diagnosis through AI.</a:t>
+              <a:t>AI algorithms excel at analyzing medical images (X-rays, MRIs, CT scans) to detect diseases earlier and more accurately.</a:t>
             </a:r>
           </a:p>
           <a:p>
@@ -3385,7 +3409,7 @@
               <a:defRPr sz="1800"/>
             </a:pPr>
             <a:r>
-              <a:t>Applications: Analyzing medical images (X-rays, MRIs), detecting diseases early, personalized medicine.</a:t>
+              <a:t>Detecting Cancerous Tumors</a:t>
             </a:r>
           </a:p>
           <a:p>
@@ -3393,7 +3417,23 @@
               <a:defRPr sz="1800"/>
             </a:pPr>
             <a:r>
-              <a:t>Reduces human error, accelerates the diagnostic process.</a:t>
+              <a:t>Identifying Anomalies in Imaging</a:t>
+            </a:r>
+          </a:p>
+          <a:p>
+            <a:pPr>
+              <a:defRPr sz="1800"/>
+            </a:pPr>
+            <a:r>
+              <a:t>Reducing Diagnostic Errors</a:t>
+            </a:r>
+          </a:p>
+          <a:p>
+            <a:pPr>
+              <a:defRPr sz="1800"/>
+            </a:pPr>
+            <a:r>
+              <a:t>Improving Patient Outcomes</a:t>
             </a:r>
           </a:p>
         </p:txBody>
@@ -3421,7 +3461,7 @@
           <a:lstStyle/>
           <a:p>
             <a:r>
-              <a:t>💡 AI analyzing medical scan image</a:t>
+              <a:t>💡 AI analyzing medical image</a:t>
             </a:r>
           </a:p>
         </p:txBody>
@@ -3460,7 +3500,7 @@
           <a:lstStyle/>
           <a:p>
             <a:r>
-              <a:t>Drug Discovery and Development</a:t>
+              <a:t>Personalized Medicine: Tailoring Treatment</a:t>
             </a:r>
           </a:p>
         </p:txBody>
@@ -3485,7 +3525,7 @@
               <a:defRPr sz="1800"/>
             </a:pPr>
             <a:r>
-              <a:t>AI accelerates drug discovery and development.</a:t>
+              <a:t>AI analyzes patient data (genetics, lifestyle, medical history) to create personalized treatment plans.</a:t>
             </a:r>
           </a:p>
           <a:p>
@@ -3493,7 +3533,7 @@
               <a:defRPr sz="1800"/>
             </a:pPr>
             <a:r>
-              <a:t>Algorithms identify potential drug candidates, predict efficacy, and optimize clinical trials.</a:t>
+              <a:t>Predicting Treatment Response</a:t>
             </a:r>
           </a:p>
           <a:p>
@@ -3501,7 +3541,23 @@
               <a:defRPr sz="1800"/>
             </a:pPr>
             <a:r>
-              <a:t>Reduces time and cost associated with traditional drug development.</a:t>
+              <a:t>Optimizing Drug Dosage</a:t>
+            </a:r>
+          </a:p>
+          <a:p>
+            <a:pPr>
+              <a:defRPr sz="1800"/>
+            </a:pPr>
+            <a:r>
+              <a:t>Identifying Patients at Risk</a:t>
+            </a:r>
+          </a:p>
+          <a:p>
+            <a:pPr>
+              <a:defRPr sz="1800"/>
+            </a:pPr>
+            <a:r>
+              <a:t>Improving Treatment Efficacy</a:t>
             </a:r>
           </a:p>
         </p:txBody>
@@ -3529,7 +3585,7 @@
           <a:lstStyle/>
           <a:p>
             <a:r>
-              <a:t>💡 AI molecule discovery illustration</a:t>
+              <a:t>💡 DNA helix personalized treatment</a:t>
             </a:r>
           </a:p>
         </p:txBody>
@@ -3568,7 +3624,7 @@
           <a:lstStyle/>
           <a:p>
             <a:r>
-              <a:t>Personalized Medicine with AI</a:t>
+              <a:t>Drug Discovery: Accelerating Innovation</a:t>
             </a:r>
           </a:p>
         </p:txBody>
@@ -3593,7 +3649,7 @@
               <a:defRPr sz="1800"/>
             </a:pPr>
             <a:r>
-              <a:t>AI tailors treatment plans based on individual patient data.</a:t>
+              <a:t>AI accelerates drug discovery by analyzing vast datasets to identify potential drug candidates and predict their efficacy.</a:t>
             </a:r>
           </a:p>
           <a:p>
@@ -3601,7 +3657,7 @@
               <a:defRPr sz="1800"/>
             </a:pPr>
             <a:r>
-              <a:t>Analyzing patient history, genetics, and lifestyle to create customized treatment strategies.</a:t>
+              <a:t>Target Identification</a:t>
             </a:r>
           </a:p>
           <a:p>
@@ -3609,7 +3665,23 @@
               <a:defRPr sz="1800"/>
             </a:pPr>
             <a:r>
-              <a:t>Improves treatment outcomes and reduces adverse effects.</a:t>
+              <a:t>Drug Design</a:t>
+            </a:r>
+          </a:p>
+          <a:p>
+            <a:pPr>
+              <a:defRPr sz="1800"/>
+            </a:pPr>
+            <a:r>
+              <a:t>Clinical Trial Optimization</a:t>
+            </a:r>
+          </a:p>
+          <a:p>
+            <a:pPr>
+              <a:defRPr sz="1800"/>
+            </a:pPr>
+            <a:r>
+              <a:t>Reducing Development Time</a:t>
             </a:r>
           </a:p>
         </p:txBody>
@@ -3637,7 +3709,7 @@
           <a:lstStyle/>
           <a:p>
             <a:r>
-              <a:t>💡 Personalized medicine genetic illustration</a:t>
+              <a:t>💡 AI designing drug molecule</a:t>
             </a:r>
           </a:p>
         </p:txBody>
@@ -3676,7 +3748,7 @@
           <a:lstStyle/>
           <a:p>
             <a:r>
-              <a:t>AI in Robotic Surgery</a:t>
+              <a:t>Operational Efficiency: Streamlining Processes</a:t>
             </a:r>
           </a:p>
         </p:txBody>
@@ -3701,7 +3773,7 @@
               <a:defRPr sz="1800"/>
             </a:pPr>
             <a:r>
-              <a:t>Enhanced precision and control in surgical procedures.</a:t>
+              <a:t>AI automates administrative tasks, optimizes workflows, and improves resource allocation in healthcare settings.</a:t>
             </a:r>
           </a:p>
           <a:p>
@@ -3709,7 +3781,7 @@
               <a:defRPr sz="1800"/>
             </a:pPr>
             <a:r>
-              <a:t>Robotic systems assist surgeons, improve dexterity, and minimize invasiveness.</a:t>
+              <a:t>Automating Scheduling</a:t>
             </a:r>
           </a:p>
           <a:p>
@@ -3717,7 +3789,23 @@
               <a:defRPr sz="1800"/>
             </a:pPr>
             <a:r>
-              <a:t>Leads to faster recovery times and reduced complications.</a:t>
+              <a:t>Predicting Patient Volume</a:t>
+            </a:r>
+          </a:p>
+          <a:p>
+            <a:pPr>
+              <a:defRPr sz="1800"/>
+            </a:pPr>
+            <a:r>
+              <a:t>Optimizing Bed Management</a:t>
+            </a:r>
+          </a:p>
+          <a:p>
+            <a:pPr>
+              <a:defRPr sz="1800"/>
+            </a:pPr>
+            <a:r>
+              <a:t>Reducing Healthcare Costs</a:t>
             </a:r>
           </a:p>
         </p:txBody>
@@ -3745,7 +3833,7 @@
           <a:lstStyle/>
           <a:p>
             <a:r>
-              <a:t>💡 Robotic surgery performing procedure</a:t>
+              <a:t>💡 Hospital automation dashboard display</a:t>
             </a:r>
           </a:p>
         </p:txBody>
@@ -3784,7 +3872,7 @@
           <a:lstStyle/>
           <a:p>
             <a:r>
-              <a:t>Challenges and Ethical Considerations</a:t>
+              <a:t>Ethical Considerations: Responsible AI</a:t>
             </a:r>
           </a:p>
         </p:txBody>
@@ -3809,7 +3897,7 @@
               <a:defRPr sz="1800"/>
             </a:pPr>
             <a:r>
-              <a:t>Data privacy and security concerns.</a:t>
+              <a:t>Ethical considerations are crucial for responsible AI adoption in healthcare.</a:t>
             </a:r>
           </a:p>
           <a:p>
@@ -3817,7 +3905,7 @@
               <a:defRPr sz="1800"/>
             </a:pPr>
             <a:r>
-              <a:t>Bias in AI algorithms and ensuring fairness.</a:t>
+              <a:t>Data Privacy and Security</a:t>
             </a:r>
           </a:p>
           <a:p>
@@ -3825,7 +3913,23 @@
               <a:defRPr sz="1800"/>
             </a:pPr>
             <a:r>
-              <a:t>Regulatory frameworks and ethical guidelines are needed for responsible AI implementation.</a:t>
+              <a:t>Algorithmic Bias</a:t>
+            </a:r>
+          </a:p>
+          <a:p>
+            <a:pPr>
+              <a:defRPr sz="1800"/>
+            </a:pPr>
+            <a:r>
+              <a:t>Transparency and Explainability</a:t>
+            </a:r>
+          </a:p>
+          <a:p>
+            <a:pPr>
+              <a:defRPr sz="1800"/>
+            </a:pPr>
+            <a:r>
+              <a:t>Human Oversight and Accountability</a:t>
             </a:r>
           </a:p>
         </p:txBody>
@@ -3853,7 +3957,7 @@
           <a:lstStyle/>
           <a:p>
             <a:r>
-              <a:t>💡 Ethical AI healthcare concept</a:t>
+              <a:t>💡 AI ethics privacy security</a:t>
             </a:r>
           </a:p>
         </p:txBody>
@@ -3892,7 +3996,7 @@
           <a:lstStyle/>
           <a:p>
             <a:r>
-              <a:t>The Future of AI in Healthcare</a:t>
+              <a:t>Challenges and Future Directions</a:t>
             </a:r>
           </a:p>
         </p:txBody>
@@ -3917,7 +4021,7 @@
               <a:defRPr sz="1800"/>
             </a:pPr>
             <a:r>
-              <a:t>Continued advancements in AI technologies.</a:t>
+              <a:t>Data availability and quality</a:t>
             </a:r>
           </a:p>
           <a:p>
@@ -3925,7 +4029,7 @@
               <a:defRPr sz="1800"/>
             </a:pPr>
             <a:r>
-              <a:t>Integration of AI into all aspects of healthcare delivery.</a:t>
+              <a:t>Regulatory hurdles</a:t>
             </a:r>
           </a:p>
           <a:p>
@@ -3933,7 +4037,31 @@
               <a:defRPr sz="1800"/>
             </a:pPr>
             <a:r>
-              <a:t>Potential for improved patient outcomes and a more efficient healthcare system.</a:t>
+              <a:t>Integration with existing systems</a:t>
+            </a:r>
+          </a:p>
+          <a:p>
+            <a:pPr>
+              <a:defRPr sz="1800"/>
+            </a:pPr>
+            <a:r>
+              <a:t>Building trust and acceptance among healthcare professionals and patients</a:t>
+            </a:r>
+          </a:p>
+          <a:p>
+            <a:pPr>
+              <a:defRPr sz="1800"/>
+            </a:pPr>
+            <a:r>
+              <a:t>Focus on explainable AI (XAI)</a:t>
+            </a:r>
+          </a:p>
+          <a:p>
+            <a:pPr>
+              <a:defRPr sz="1800"/>
+            </a:pPr>
+            <a:r>
+              <a:t>Continuous monitoring and evaluation</a:t>
             </a:r>
           </a:p>
         </p:txBody>
@@ -3961,7 +4089,7 @@
           <a:lstStyle/>
           <a:p>
             <a:r>
-              <a:t>💡 Futuristic AI healthcare interface</a:t>
+              <a:t>💡 Future healthcare technology vision</a:t>
             </a:r>
           </a:p>
         </p:txBody>

</xml_diff>